<commit_message>
Adds solutions to week 17 day 1
</commit_message>
<xml_diff>
--- a/supplemental/CRUD_operations.pptx
+++ b/supplemental/CRUD_operations.pptx
@@ -199,7 +199,7 @@
           <a:p>
             <a:fld id="{20C4B8F1-9FE6-C141-BF79-6E70D695402D}" type="datetimeFigureOut">
               <a:rPr lang="en-US" smtClean="0"/>
-              <a:t>6/23/20</a:t>
+              <a:t>1/5/21</a:t>
             </a:fld>
             <a:endParaRPr lang="en-US"/>
           </a:p>
@@ -613,7 +613,7 @@
           <a:p>
             <a:fld id="{C9D1F726-83FE-E943-BBFA-C0774C95B26B}" type="datetimeFigureOut">
               <a:rPr lang="en-US" smtClean="0"/>
-              <a:t>6/23/20</a:t>
+              <a:t>1/5/21</a:t>
             </a:fld>
             <a:endParaRPr lang="en-US"/>
           </a:p>
@@ -811,7 +811,7 @@
           <a:p>
             <a:fld id="{C9D1F726-83FE-E943-BBFA-C0774C95B26B}" type="datetimeFigureOut">
               <a:rPr lang="en-US" smtClean="0"/>
-              <a:t>6/23/20</a:t>
+              <a:t>1/5/21</a:t>
             </a:fld>
             <a:endParaRPr lang="en-US"/>
           </a:p>
@@ -1019,7 +1019,7 @@
           <a:p>
             <a:fld id="{C9D1F726-83FE-E943-BBFA-C0774C95B26B}" type="datetimeFigureOut">
               <a:rPr lang="en-US" smtClean="0"/>
-              <a:t>6/23/20</a:t>
+              <a:t>1/5/21</a:t>
             </a:fld>
             <a:endParaRPr lang="en-US"/>
           </a:p>
@@ -1217,7 +1217,7 @@
           <a:p>
             <a:fld id="{C9D1F726-83FE-E943-BBFA-C0774C95B26B}" type="datetimeFigureOut">
               <a:rPr lang="en-US" smtClean="0"/>
-              <a:t>6/23/20</a:t>
+              <a:t>1/5/21</a:t>
             </a:fld>
             <a:endParaRPr lang="en-US"/>
           </a:p>
@@ -1492,7 +1492,7 @@
           <a:p>
             <a:fld id="{C9D1F726-83FE-E943-BBFA-C0774C95B26B}" type="datetimeFigureOut">
               <a:rPr lang="en-US" smtClean="0"/>
-              <a:t>6/23/20</a:t>
+              <a:t>1/5/21</a:t>
             </a:fld>
             <a:endParaRPr lang="en-US"/>
           </a:p>
@@ -1757,7 +1757,7 @@
           <a:p>
             <a:fld id="{C9D1F726-83FE-E943-BBFA-C0774C95B26B}" type="datetimeFigureOut">
               <a:rPr lang="en-US" smtClean="0"/>
-              <a:t>6/23/20</a:t>
+              <a:t>1/5/21</a:t>
             </a:fld>
             <a:endParaRPr lang="en-US"/>
           </a:p>
@@ -2169,7 +2169,7 @@
           <a:p>
             <a:fld id="{C9D1F726-83FE-E943-BBFA-C0774C95B26B}" type="datetimeFigureOut">
               <a:rPr lang="en-US" smtClean="0"/>
-              <a:t>6/23/20</a:t>
+              <a:t>1/5/21</a:t>
             </a:fld>
             <a:endParaRPr lang="en-US"/>
           </a:p>
@@ -2310,7 +2310,7 @@
           <a:p>
             <a:fld id="{C9D1F726-83FE-E943-BBFA-C0774C95B26B}" type="datetimeFigureOut">
               <a:rPr lang="en-US" smtClean="0"/>
-              <a:t>6/23/20</a:t>
+              <a:t>1/5/21</a:t>
             </a:fld>
             <a:endParaRPr lang="en-US"/>
           </a:p>
@@ -2423,7 +2423,7 @@
           <a:p>
             <a:fld id="{C9D1F726-83FE-E943-BBFA-C0774C95B26B}" type="datetimeFigureOut">
               <a:rPr lang="en-US" smtClean="0"/>
-              <a:t>6/23/20</a:t>
+              <a:t>1/5/21</a:t>
             </a:fld>
             <a:endParaRPr lang="en-US"/>
           </a:p>
@@ -2734,7 +2734,7 @@
           <a:p>
             <a:fld id="{C9D1F726-83FE-E943-BBFA-C0774C95B26B}" type="datetimeFigureOut">
               <a:rPr lang="en-US" smtClean="0"/>
-              <a:t>6/23/20</a:t>
+              <a:t>1/5/21</a:t>
             </a:fld>
             <a:endParaRPr lang="en-US"/>
           </a:p>
@@ -3022,7 +3022,7 @@
           <a:p>
             <a:fld id="{C9D1F726-83FE-E943-BBFA-C0774C95B26B}" type="datetimeFigureOut">
               <a:rPr lang="en-US" smtClean="0"/>
-              <a:t>6/23/20</a:t>
+              <a:t>1/5/21</a:t>
             </a:fld>
             <a:endParaRPr lang="en-US"/>
           </a:p>
@@ -3263,7 +3263,7 @@
           <a:p>
             <a:fld id="{C9D1F726-83FE-E943-BBFA-C0774C95B26B}" type="datetimeFigureOut">
               <a:rPr lang="en-US" smtClean="0"/>
-              <a:t>6/23/20</a:t>
+              <a:t>1/5/21</a:t>
             </a:fld>
             <a:endParaRPr lang="en-US"/>
           </a:p>
@@ -3695,7 +3695,7 @@
           <p:nvPr>
             <p:extLst>
               <p:ext uri="{D42A27DB-BD31-4B8C-83A1-F6EECF244321}">
-                <p14:modId xmlns:p14="http://schemas.microsoft.com/office/powerpoint/2010/main" val="3207617466"/>
+                <p14:modId xmlns:p14="http://schemas.microsoft.com/office/powerpoint/2010/main" val="3695216937"/>
               </p:ext>
             </p:extLst>
           </p:nvPr>
@@ -3880,11 +3880,28 @@
                     <a:bodyPr/>
                     <a:lstStyle/>
                     <a:p>
-                      <a:r>
-                        <a:rPr lang="en-US" baseline="0" dirty="0">
+                      <a:pPr marL="0" marR="0" lvl="0" indent="0" algn="l" defTabSz="914400" rtl="0" eaLnBrk="1" fontAlgn="auto" latinLnBrk="0" hangingPunct="1">
+                        <a:lnSpc>
+                          <a:spcPct val="100000"/>
+                        </a:lnSpc>
+                        <a:spcBef>
+                          <a:spcPts val="0"/>
+                        </a:spcBef>
+                        <a:spcAft>
+                          <a:spcPts val="0"/>
+                        </a:spcAft>
+                        <a:buClrTx/>
+                        <a:buSzTx/>
+                        <a:buFontTx/>
+                        <a:buNone/>
+                        <a:tabLst/>
+                        <a:defRPr/>
+                      </a:pPr>
+                      <a:r>
+                        <a:rPr lang="en-US" baseline="0">
                           <a:latin typeface="Courier" pitchFamily="2" charset="0"/>
                         </a:rPr>
-                        <a:t>$.delete</a:t>
+                        <a:t>$.ajax({method: “DELETE”})</a:t>
                       </a:r>
                     </a:p>
                   </a:txBody>
@@ -4377,7 +4394,7 @@
           <p:nvPr>
             <p:extLst>
               <p:ext uri="{D42A27DB-BD31-4B8C-83A1-F6EECF244321}">
-                <p14:modId xmlns:p14="http://schemas.microsoft.com/office/powerpoint/2010/main" val="1174803383"/>
+                <p14:modId xmlns:p14="http://schemas.microsoft.com/office/powerpoint/2010/main" val="3011584168"/>
               </p:ext>
             </p:extLst>
           </p:nvPr>
@@ -4566,7 +4583,7 @@
                         <a:rPr lang="en-US" baseline="0" dirty="0">
                           <a:latin typeface="Courier" pitchFamily="2" charset="0"/>
                         </a:rPr>
-                        <a:t>$.delete</a:t>
+                        <a:t>$.ajax({method: “DELETE”})</a:t>
                       </a:r>
                     </a:p>
                   </a:txBody>

</xml_diff>